<commit_message>
Change new ribbon ui
</commit_message>
<xml_diff>
--- a/doc/Icons-CaptionsLab.pptx
+++ b/doc/Icons-CaptionsLab.pptx
@@ -221,7 +221,7 @@
           <a:p>
             <a:fld id="{6699ACB9-486C-4D62-A3A7-AF98E13EFDA3}" type="datetimeFigureOut">
               <a:rPr lang="en-US" smtClean="0"/>
-              <a:t>6/6/2017</a:t>
+              <a:t>6/9/2017</a:t>
             </a:fld>
             <a:endParaRPr lang="en-US"/>
           </a:p>
@@ -752,7 +752,7 @@
             <a:fld id="{1D8BD707-D9CF-40AE-B4C6-C98DA3205C09}" type="datetimeFigureOut">
               <a:rPr lang="en-US" smtClean="0"/>
               <a:pPr/>
-              <a:t>6/6/2017</a:t>
+              <a:t>6/9/2017</a:t>
             </a:fld>
             <a:endParaRPr lang="en-US"/>
           </a:p>
@@ -917,7 +917,7 @@
             <a:fld id="{1D8BD707-D9CF-40AE-B4C6-C98DA3205C09}" type="datetimeFigureOut">
               <a:rPr lang="en-US" smtClean="0"/>
               <a:pPr/>
-              <a:t>6/6/2017</a:t>
+              <a:t>6/9/2017</a:t>
             </a:fld>
             <a:endParaRPr lang="en-US"/>
           </a:p>
@@ -1092,7 +1092,7 @@
             <a:fld id="{1D8BD707-D9CF-40AE-B4C6-C98DA3205C09}" type="datetimeFigureOut">
               <a:rPr lang="en-US" smtClean="0"/>
               <a:pPr/>
-              <a:t>6/6/2017</a:t>
+              <a:t>6/9/2017</a:t>
             </a:fld>
             <a:endParaRPr lang="en-US"/>
           </a:p>
@@ -1257,7 +1257,7 @@
             <a:fld id="{1D8BD707-D9CF-40AE-B4C6-C98DA3205C09}" type="datetimeFigureOut">
               <a:rPr lang="en-US" smtClean="0"/>
               <a:pPr/>
-              <a:t>6/6/2017</a:t>
+              <a:t>6/9/2017</a:t>
             </a:fld>
             <a:endParaRPr lang="en-US"/>
           </a:p>
@@ -1499,7 +1499,7 @@
             <a:fld id="{1D8BD707-D9CF-40AE-B4C6-C98DA3205C09}" type="datetimeFigureOut">
               <a:rPr lang="en-US" smtClean="0"/>
               <a:pPr/>
-              <a:t>6/6/2017</a:t>
+              <a:t>6/9/2017</a:t>
             </a:fld>
             <a:endParaRPr lang="en-US"/>
           </a:p>
@@ -1781,7 +1781,7 @@
             <a:fld id="{1D8BD707-D9CF-40AE-B4C6-C98DA3205C09}" type="datetimeFigureOut">
               <a:rPr lang="en-US" smtClean="0"/>
               <a:pPr/>
-              <a:t>6/6/2017</a:t>
+              <a:t>6/9/2017</a:t>
             </a:fld>
             <a:endParaRPr lang="en-US"/>
           </a:p>
@@ -2197,7 +2197,7 @@
             <a:fld id="{1D8BD707-D9CF-40AE-B4C6-C98DA3205C09}" type="datetimeFigureOut">
               <a:rPr lang="en-US" smtClean="0"/>
               <a:pPr/>
-              <a:t>6/6/2017</a:t>
+              <a:t>6/9/2017</a:t>
             </a:fld>
             <a:endParaRPr lang="en-US"/>
           </a:p>
@@ -2311,7 +2311,7 @@
             <a:fld id="{1D8BD707-D9CF-40AE-B4C6-C98DA3205C09}" type="datetimeFigureOut">
               <a:rPr lang="en-US" smtClean="0"/>
               <a:pPr/>
-              <a:t>6/6/2017</a:t>
+              <a:t>6/9/2017</a:t>
             </a:fld>
             <a:endParaRPr lang="en-US"/>
           </a:p>
@@ -2403,7 +2403,7 @@
             <a:fld id="{1D8BD707-D9CF-40AE-B4C6-C98DA3205C09}" type="datetimeFigureOut">
               <a:rPr lang="en-US" smtClean="0"/>
               <a:pPr/>
-              <a:t>6/6/2017</a:t>
+              <a:t>6/9/2017</a:t>
             </a:fld>
             <a:endParaRPr lang="en-US"/>
           </a:p>
@@ -2675,7 +2675,7 @@
             <a:fld id="{1D8BD707-D9CF-40AE-B4C6-C98DA3205C09}" type="datetimeFigureOut">
               <a:rPr lang="en-US" smtClean="0"/>
               <a:pPr/>
-              <a:t>6/6/2017</a:t>
+              <a:t>6/9/2017</a:t>
             </a:fld>
             <a:endParaRPr lang="en-US"/>
           </a:p>
@@ -2924,7 +2924,7 @@
             <a:fld id="{1D8BD707-D9CF-40AE-B4C6-C98DA3205C09}" type="datetimeFigureOut">
               <a:rPr lang="en-US" smtClean="0"/>
               <a:pPr/>
-              <a:t>6/6/2017</a:t>
+              <a:t>6/9/2017</a:t>
             </a:fld>
             <a:endParaRPr lang="en-US"/>
           </a:p>
@@ -3132,7 +3132,7 @@
             <a:fld id="{1D8BD707-D9CF-40AE-B4C6-C98DA3205C09}" type="datetimeFigureOut">
               <a:rPr lang="en-US" smtClean="0"/>
               <a:pPr/>
-              <a:t>6/6/2017</a:t>
+              <a:t>6/9/2017</a:t>
             </a:fld>
             <a:endParaRPr lang="en-US"/>
           </a:p>
@@ -3878,7 +3878,7 @@
         </p:nvGrpSpPr>
         <p:grpSpPr>
           <a:xfrm>
-            <a:off x="4050506" y="4264670"/>
+            <a:off x="2949409" y="4388449"/>
             <a:ext cx="838200" cy="838200"/>
             <a:chOff x="5550695" y="3954500"/>
             <a:chExt cx="838200" cy="838200"/>
@@ -4246,7 +4246,7 @@
         </p:nvSpPr>
         <p:spPr>
           <a:xfrm>
-            <a:off x="4142314" y="5116180"/>
+            <a:off x="2997305" y="5682064"/>
             <a:ext cx="689438" cy="338554"/>
           </a:xfrm>
           <a:prstGeom prst="rect">
@@ -4692,7 +4692,7 @@
       </p:sp>
       <p:sp>
         <p:nvSpPr>
-          <p:cNvPr id="4" name="Rectangle 3"/>
+          <p:cNvPr id="99" name="Freeform: Shape 98"/>
           <p:cNvSpPr/>
           <p:nvPr/>
         </p:nvSpPr>
@@ -4701,9 +4701,126 @@
             <a:off x="2318112" y="1688123"/>
             <a:ext cx="478734" cy="241108"/>
           </a:xfrm>
-          <a:prstGeom prst="rect">
+          <a:custGeom>
             <a:avLst/>
-          </a:prstGeom>
+            <a:gdLst>
+              <a:gd name="connsiteX0" fmla="*/ 341885 w 478734"/>
+              <a:gd name="connsiteY0" fmla="*/ 105894 h 241108"/>
+              <a:gd name="connsiteX1" fmla="*/ 284953 w 478734"/>
+              <a:gd name="connsiteY1" fmla="*/ 198593 h 241108"/>
+              <a:gd name="connsiteX2" fmla="*/ 398816 w 478734"/>
+              <a:gd name="connsiteY2" fmla="*/ 198593 h 241108"/>
+              <a:gd name="connsiteX3" fmla="*/ 143308 w 478734"/>
+              <a:gd name="connsiteY3" fmla="*/ 46009 h 241108"/>
+              <a:gd name="connsiteX4" fmla="*/ 84794 w 478734"/>
+              <a:gd name="connsiteY4" fmla="*/ 104523 h 241108"/>
+              <a:gd name="connsiteX5" fmla="*/ 143308 w 478734"/>
+              <a:gd name="connsiteY5" fmla="*/ 163037 h 241108"/>
+              <a:gd name="connsiteX6" fmla="*/ 201822 w 478734"/>
+              <a:gd name="connsiteY6" fmla="*/ 104523 h 241108"/>
+              <a:gd name="connsiteX7" fmla="*/ 143308 w 478734"/>
+              <a:gd name="connsiteY7" fmla="*/ 46009 h 241108"/>
+              <a:gd name="connsiteX8" fmla="*/ 0 w 478734"/>
+              <a:gd name="connsiteY8" fmla="*/ 0 h 241108"/>
+              <a:gd name="connsiteX9" fmla="*/ 478734 w 478734"/>
+              <a:gd name="connsiteY9" fmla="*/ 0 h 241108"/>
+              <a:gd name="connsiteX10" fmla="*/ 478734 w 478734"/>
+              <a:gd name="connsiteY10" fmla="*/ 241108 h 241108"/>
+              <a:gd name="connsiteX11" fmla="*/ 0 w 478734"/>
+              <a:gd name="connsiteY11" fmla="*/ 241108 h 241108"/>
+            </a:gdLst>
+            <a:ahLst/>
+            <a:cxnLst>
+              <a:cxn ang="0">
+                <a:pos x="connsiteX0" y="connsiteY0"/>
+              </a:cxn>
+              <a:cxn ang="0">
+                <a:pos x="connsiteX1" y="connsiteY1"/>
+              </a:cxn>
+              <a:cxn ang="0">
+                <a:pos x="connsiteX2" y="connsiteY2"/>
+              </a:cxn>
+              <a:cxn ang="0">
+                <a:pos x="connsiteX3" y="connsiteY3"/>
+              </a:cxn>
+              <a:cxn ang="0">
+                <a:pos x="connsiteX4" y="connsiteY4"/>
+              </a:cxn>
+              <a:cxn ang="0">
+                <a:pos x="connsiteX5" y="connsiteY5"/>
+              </a:cxn>
+              <a:cxn ang="0">
+                <a:pos x="connsiteX6" y="connsiteY6"/>
+              </a:cxn>
+              <a:cxn ang="0">
+                <a:pos x="connsiteX7" y="connsiteY7"/>
+              </a:cxn>
+              <a:cxn ang="0">
+                <a:pos x="connsiteX8" y="connsiteY8"/>
+              </a:cxn>
+              <a:cxn ang="0">
+                <a:pos x="connsiteX9" y="connsiteY9"/>
+              </a:cxn>
+              <a:cxn ang="0">
+                <a:pos x="connsiteX10" y="connsiteY10"/>
+              </a:cxn>
+              <a:cxn ang="0">
+                <a:pos x="connsiteX11" y="connsiteY11"/>
+              </a:cxn>
+            </a:cxnLst>
+            <a:rect l="l" t="t" r="r" b="b"/>
+            <a:pathLst>
+              <a:path w="478734" h="241108">
+                <a:moveTo>
+                  <a:pt x="341885" y="105894"/>
+                </a:moveTo>
+                <a:lnTo>
+                  <a:pt x="284953" y="198593"/>
+                </a:lnTo>
+                <a:lnTo>
+                  <a:pt x="398816" y="198593"/>
+                </a:lnTo>
+                <a:close/>
+                <a:moveTo>
+                  <a:pt x="143308" y="46009"/>
+                </a:moveTo>
+                <a:cubicBezTo>
+                  <a:pt x="110992" y="46009"/>
+                  <a:pt x="84794" y="72207"/>
+                  <a:pt x="84794" y="104523"/>
+                </a:cubicBezTo>
+                <a:cubicBezTo>
+                  <a:pt x="84794" y="136839"/>
+                  <a:pt x="110992" y="163037"/>
+                  <a:pt x="143308" y="163037"/>
+                </a:cubicBezTo>
+                <a:cubicBezTo>
+                  <a:pt x="175624" y="163037"/>
+                  <a:pt x="201822" y="136839"/>
+                  <a:pt x="201822" y="104523"/>
+                </a:cubicBezTo>
+                <a:cubicBezTo>
+                  <a:pt x="201822" y="72207"/>
+                  <a:pt x="175624" y="46009"/>
+                  <a:pt x="143308" y="46009"/>
+                </a:cubicBezTo>
+                <a:close/>
+                <a:moveTo>
+                  <a:pt x="0" y="0"/>
+                </a:moveTo>
+                <a:lnTo>
+                  <a:pt x="478734" y="0"/>
+                </a:lnTo>
+                <a:lnTo>
+                  <a:pt x="478734" y="241108"/>
+                </a:lnTo>
+                <a:lnTo>
+                  <a:pt x="0" y="241108"/>
+                </a:lnTo>
+                <a:close/>
+              </a:path>
+            </a:pathLst>
+          </a:custGeom>
           <a:solidFill>
             <a:srgbClr val="0070C0"/>
           </a:solidFill>
@@ -4728,7 +4845,9 @@
           </a:fontRef>
         </p:style>
         <p:txBody>
-          <a:bodyPr rtlCol="0" anchor="ctr"/>
+          <a:bodyPr wrap="square" rtlCol="0" anchor="ctr">
+            <a:noAutofit/>
+          </a:bodyPr>
           <a:lstStyle/>
           <a:p>
             <a:pPr algn="ctr"/>
@@ -5126,98 +5245,6 @@
           </a:p>
         </p:txBody>
       </p:sp>
-      <p:sp>
-        <p:nvSpPr>
-          <p:cNvPr id="5" name="Isosceles Triangle 4"/>
-          <p:cNvSpPr/>
-          <p:nvPr/>
-        </p:nvSpPr>
-        <p:spPr>
-          <a:xfrm>
-            <a:off x="2603065" y="1794017"/>
-            <a:ext cx="113863" cy="92699"/>
-          </a:xfrm>
-          <a:prstGeom prst="triangle">
-            <a:avLst/>
-          </a:prstGeom>
-          <a:solidFill>
-            <a:schemeClr val="bg1"/>
-          </a:solidFill>
-          <a:ln>
-            <a:noFill/>
-          </a:ln>
-        </p:spPr>
-        <p:style>
-          <a:lnRef idx="2">
-            <a:schemeClr val="accent1">
-              <a:shade val="50000"/>
-            </a:schemeClr>
-          </a:lnRef>
-          <a:fillRef idx="1">
-            <a:schemeClr val="accent1"/>
-          </a:fillRef>
-          <a:effectRef idx="0">
-            <a:schemeClr val="accent1"/>
-          </a:effectRef>
-          <a:fontRef idx="minor">
-            <a:schemeClr val="lt1"/>
-          </a:fontRef>
-        </p:style>
-        <p:txBody>
-          <a:bodyPr rtlCol="0" anchor="ctr"/>
-          <a:lstStyle/>
-          <a:p>
-            <a:pPr algn="ctr"/>
-            <a:endParaRPr lang="en-US"/>
-          </a:p>
-        </p:txBody>
-      </p:sp>
-      <p:sp>
-        <p:nvSpPr>
-          <p:cNvPr id="7" name="Oval 6"/>
-          <p:cNvSpPr/>
-          <p:nvPr/>
-        </p:nvSpPr>
-        <p:spPr>
-          <a:xfrm>
-            <a:off x="2402906" y="1734132"/>
-            <a:ext cx="117028" cy="117028"/>
-          </a:xfrm>
-          <a:prstGeom prst="ellipse">
-            <a:avLst/>
-          </a:prstGeom>
-          <a:solidFill>
-            <a:schemeClr val="bg1"/>
-          </a:solidFill>
-          <a:ln>
-            <a:noFill/>
-          </a:ln>
-        </p:spPr>
-        <p:style>
-          <a:lnRef idx="2">
-            <a:schemeClr val="accent1">
-              <a:shade val="50000"/>
-            </a:schemeClr>
-          </a:lnRef>
-          <a:fillRef idx="1">
-            <a:schemeClr val="accent1"/>
-          </a:fillRef>
-          <a:effectRef idx="0">
-            <a:schemeClr val="accent1"/>
-          </a:effectRef>
-          <a:fontRef idx="minor">
-            <a:schemeClr val="lt1"/>
-          </a:fontRef>
-        </p:style>
-        <p:txBody>
-          <a:bodyPr rtlCol="0" anchor="ctr"/>
-          <a:lstStyle/>
-          <a:p>
-            <a:pPr algn="ctr"/>
-            <a:endParaRPr lang="en-US"/>
-          </a:p>
-        </p:txBody>
-      </p:sp>
       <p:grpSp>
         <p:nvGrpSpPr>
           <p:cNvPr id="101" name="Group 100"/>
@@ -7238,7 +7265,7 @@
         </p:nvSpPr>
         <p:spPr>
           <a:xfrm rot="2789166">
-            <a:off x="4371354" y="4480317"/>
+            <a:off x="3270257" y="4604096"/>
             <a:ext cx="581820" cy="581820"/>
           </a:xfrm>
           <a:prstGeom prst="mathPlus">
@@ -7587,130 +7614,225 @@
           </a:p>
         </p:txBody>
       </p:sp>
+      <p:sp>
+        <p:nvSpPr>
+          <p:cNvPr id="138" name="TextBox 137"/>
+          <p:cNvSpPr txBox="1"/>
+          <p:nvPr/>
+        </p:nvSpPr>
+        <p:spPr>
+          <a:xfrm>
+            <a:off x="1273075" y="5628138"/>
+            <a:ext cx="689438" cy="338554"/>
+          </a:xfrm>
+          <a:prstGeom prst="rect">
+            <a:avLst/>
+          </a:prstGeom>
+          <a:noFill/>
+        </p:spPr>
+        <p:txBody>
+          <a:bodyPr wrap="square" rtlCol="0">
+            <a:spAutoFit/>
+          </a:bodyPr>
+          <a:lstStyle/>
+          <a:p>
+            <a:r>
+              <a:rPr lang="en-US" sz="800" dirty="0"/>
+              <a:t>Add captions</a:t>
+            </a:r>
+            <a:endParaRPr lang="en-SG" sz="800" dirty="0"/>
+          </a:p>
+        </p:txBody>
+      </p:sp>
       <p:grpSp>
         <p:nvGrpSpPr>
-          <p:cNvPr id="134" name="Group 133"/>
+          <p:cNvPr id="2" name="Group 1"/>
           <p:cNvGrpSpPr/>
           <p:nvPr/>
         </p:nvGrpSpPr>
         <p:grpSpPr>
           <a:xfrm>
-            <a:off x="3019733" y="4264670"/>
-            <a:ext cx="838200" cy="838200"/>
-            <a:chOff x="5550695" y="3954500"/>
-            <a:chExt cx="838200" cy="838200"/>
+            <a:off x="1240213" y="4381925"/>
+            <a:ext cx="893660" cy="838200"/>
+            <a:chOff x="3019733" y="4264670"/>
+            <a:chExt cx="893660" cy="838200"/>
           </a:xfrm>
         </p:grpSpPr>
+        <p:grpSp>
+          <p:nvGrpSpPr>
+            <p:cNvPr id="134" name="Group 133"/>
+            <p:cNvGrpSpPr/>
+            <p:nvPr/>
+          </p:nvGrpSpPr>
+          <p:grpSpPr>
+            <a:xfrm>
+              <a:off x="3019733" y="4264670"/>
+              <a:ext cx="838200" cy="838200"/>
+              <a:chOff x="5550695" y="3954500"/>
+              <a:chExt cx="838200" cy="838200"/>
+            </a:xfrm>
+          </p:grpSpPr>
+          <p:sp>
+            <p:nvSpPr>
+              <p:cNvPr id="135" name="Rectangle 134"/>
+              <p:cNvSpPr/>
+              <p:nvPr/>
+            </p:nvSpPr>
+            <p:spPr>
+              <a:xfrm>
+                <a:off x="5646013" y="4073734"/>
+                <a:ext cx="642016" cy="379712"/>
+              </a:xfrm>
+              <a:prstGeom prst="rect">
+                <a:avLst/>
+              </a:prstGeom>
+              <a:solidFill>
+                <a:schemeClr val="accent6"/>
+              </a:solidFill>
+              <a:ln>
+                <a:solidFill>
+                  <a:schemeClr val="accent6"/>
+                </a:solidFill>
+              </a:ln>
+            </p:spPr>
+            <p:style>
+              <a:lnRef idx="2">
+                <a:schemeClr val="accent1">
+                  <a:shade val="50000"/>
+                </a:schemeClr>
+              </a:lnRef>
+              <a:fillRef idx="1">
+                <a:schemeClr val="accent1"/>
+              </a:fillRef>
+              <a:effectRef idx="0">
+                <a:schemeClr val="accent1"/>
+              </a:effectRef>
+              <a:fontRef idx="minor">
+                <a:schemeClr val="lt1"/>
+              </a:fontRef>
+            </p:style>
+            <p:txBody>
+              <a:bodyPr rtlCol="0" anchor="ctr"/>
+              <a:lstStyle/>
+              <a:p>
+                <a:pPr algn="ctr"/>
+                <a:endParaRPr lang="en-US"/>
+              </a:p>
+            </p:txBody>
+          </p:sp>
+          <p:sp>
+            <p:nvSpPr>
+              <p:cNvPr id="136" name="Rectangle 135"/>
+              <p:cNvSpPr/>
+              <p:nvPr/>
+            </p:nvSpPr>
+            <p:spPr>
+              <a:xfrm>
+                <a:off x="5550695" y="3954500"/>
+                <a:ext cx="838200" cy="838200"/>
+              </a:xfrm>
+              <a:prstGeom prst="rect">
+                <a:avLst/>
+              </a:prstGeom>
+              <a:noFill/>
+              <a:ln>
+                <a:noFill/>
+              </a:ln>
+            </p:spPr>
+            <p:style>
+              <a:lnRef idx="2">
+                <a:schemeClr val="accent1">
+                  <a:shade val="50000"/>
+                </a:schemeClr>
+              </a:lnRef>
+              <a:fillRef idx="1">
+                <a:schemeClr val="accent1"/>
+              </a:fillRef>
+              <a:effectRef idx="0">
+                <a:schemeClr val="accent1"/>
+              </a:effectRef>
+              <a:fontRef idx="minor">
+                <a:schemeClr val="lt1"/>
+              </a:fontRef>
+            </p:style>
+            <p:txBody>
+              <a:bodyPr rtlCol="0" anchor="ctr"/>
+              <a:lstStyle/>
+              <a:p>
+                <a:pPr algn="ctr"/>
+                <a:endParaRPr lang="en-SG"/>
+              </a:p>
+            </p:txBody>
+          </p:sp>
+          <p:sp>
+            <p:nvSpPr>
+              <p:cNvPr id="137" name="Rectangle 136"/>
+              <p:cNvSpPr/>
+              <p:nvPr/>
+            </p:nvSpPr>
+            <p:spPr>
+              <a:xfrm>
+                <a:off x="5621737" y="4465251"/>
+                <a:ext cx="687682" cy="98991"/>
+              </a:xfrm>
+              <a:prstGeom prst="rect">
+                <a:avLst/>
+              </a:prstGeom>
+              <a:solidFill>
+                <a:srgbClr val="0070C0"/>
+              </a:solidFill>
+              <a:ln>
+                <a:solidFill>
+                  <a:schemeClr val="bg1"/>
+                </a:solidFill>
+              </a:ln>
+            </p:spPr>
+            <p:style>
+              <a:lnRef idx="2">
+                <a:schemeClr val="accent1">
+                  <a:shade val="50000"/>
+                </a:schemeClr>
+              </a:lnRef>
+              <a:fillRef idx="1">
+                <a:schemeClr val="accent1"/>
+              </a:fillRef>
+              <a:effectRef idx="0">
+                <a:schemeClr val="accent1"/>
+              </a:effectRef>
+              <a:fontRef idx="minor">
+                <a:schemeClr val="lt1"/>
+              </a:fontRef>
+            </p:style>
+            <p:txBody>
+              <a:bodyPr rtlCol="0" anchor="ctr"/>
+              <a:lstStyle/>
+              <a:p>
+                <a:pPr algn="ctr"/>
+                <a:endParaRPr lang="en-US"/>
+              </a:p>
+            </p:txBody>
+          </p:sp>
+        </p:grpSp>
         <p:sp>
           <p:nvSpPr>
-            <p:cNvPr id="135" name="Rectangle 134"/>
-            <p:cNvSpPr/>
+            <p:cNvPr id="139" name="Plus 167"/>
+            <p:cNvSpPr>
+              <a:spLocks noChangeAspect="1"/>
+            </p:cNvSpPr>
             <p:nvPr/>
           </p:nvSpPr>
           <p:spPr>
             <a:xfrm>
-              <a:off x="5646013" y="4073734"/>
-              <a:ext cx="642016" cy="379712"/>
+              <a:off x="3331573" y="4471309"/>
+              <a:ext cx="581820" cy="581820"/>
             </a:xfrm>
-            <a:prstGeom prst="rect">
+            <a:prstGeom prst="mathPlus">
               <a:avLst/>
             </a:prstGeom>
             <a:solidFill>
-              <a:schemeClr val="accent6"/>
+              <a:srgbClr val="00B050"/>
             </a:solidFill>
-            <a:ln>
-              <a:solidFill>
-                <a:schemeClr val="accent6"/>
-              </a:solidFill>
-            </a:ln>
-          </p:spPr>
-          <p:style>
-            <a:lnRef idx="2">
-              <a:schemeClr val="accent1">
-                <a:shade val="50000"/>
-              </a:schemeClr>
-            </a:lnRef>
-            <a:fillRef idx="1">
-              <a:schemeClr val="accent1"/>
-            </a:fillRef>
-            <a:effectRef idx="0">
-              <a:schemeClr val="accent1"/>
-            </a:effectRef>
-            <a:fontRef idx="minor">
-              <a:schemeClr val="lt1"/>
-            </a:fontRef>
-          </p:style>
-          <p:txBody>
-            <a:bodyPr rtlCol="0" anchor="ctr"/>
-            <a:lstStyle/>
-            <a:p>
-              <a:pPr algn="ctr"/>
-              <a:endParaRPr lang="en-US"/>
-            </a:p>
-          </p:txBody>
-        </p:sp>
-        <p:sp>
-          <p:nvSpPr>
-            <p:cNvPr id="136" name="Rectangle 135"/>
-            <p:cNvSpPr/>
-            <p:nvPr/>
-          </p:nvSpPr>
-          <p:spPr>
-            <a:xfrm>
-              <a:off x="5550695" y="3954500"/>
-              <a:ext cx="838200" cy="838200"/>
-            </a:xfrm>
-            <a:prstGeom prst="rect">
-              <a:avLst/>
-            </a:prstGeom>
-            <a:noFill/>
-            <a:ln>
-              <a:noFill/>
-            </a:ln>
-          </p:spPr>
-          <p:style>
-            <a:lnRef idx="2">
-              <a:schemeClr val="accent1">
-                <a:shade val="50000"/>
-              </a:schemeClr>
-            </a:lnRef>
-            <a:fillRef idx="1">
-              <a:schemeClr val="accent1"/>
-            </a:fillRef>
-            <a:effectRef idx="0">
-              <a:schemeClr val="accent1"/>
-            </a:effectRef>
-            <a:fontRef idx="minor">
-              <a:schemeClr val="lt1"/>
-            </a:fontRef>
-          </p:style>
-          <p:txBody>
-            <a:bodyPr rtlCol="0" anchor="ctr"/>
-            <a:lstStyle/>
-            <a:p>
-              <a:pPr algn="ctr"/>
-              <a:endParaRPr lang="en-SG"/>
-            </a:p>
-          </p:txBody>
-        </p:sp>
-        <p:sp>
-          <p:nvSpPr>
-            <p:cNvPr id="137" name="Rectangle 136"/>
-            <p:cNvSpPr/>
-            <p:nvPr/>
-          </p:nvSpPr>
-          <p:spPr>
-            <a:xfrm>
-              <a:off x="5621737" y="4465251"/>
-              <a:ext cx="687682" cy="98991"/>
-            </a:xfrm>
-            <a:prstGeom prst="rect">
-              <a:avLst/>
-            </a:prstGeom>
-            <a:solidFill>
-              <a:srgbClr val="0070C0"/>
-            </a:solidFill>
-            <a:ln>
+            <a:ln w="38100">
               <a:solidFill>
                 <a:schemeClr val="bg1"/>
               </a:solidFill>
@@ -7742,86 +7864,6 @@
           </p:txBody>
         </p:sp>
       </p:grpSp>
-      <p:sp>
-        <p:nvSpPr>
-          <p:cNvPr id="138" name="TextBox 137"/>
-          <p:cNvSpPr txBox="1"/>
-          <p:nvPr/>
-        </p:nvSpPr>
-        <p:spPr>
-          <a:xfrm>
-            <a:off x="3111541" y="5116180"/>
-            <a:ext cx="689438" cy="338554"/>
-          </a:xfrm>
-          <a:prstGeom prst="rect">
-            <a:avLst/>
-          </a:prstGeom>
-          <a:noFill/>
-        </p:spPr>
-        <p:txBody>
-          <a:bodyPr wrap="square" rtlCol="0">
-            <a:spAutoFit/>
-          </a:bodyPr>
-          <a:lstStyle/>
-          <a:p>
-            <a:r>
-              <a:rPr lang="en-US" sz="800" dirty="0"/>
-              <a:t>Add captions</a:t>
-            </a:r>
-            <a:endParaRPr lang="en-SG" sz="800" dirty="0"/>
-          </a:p>
-        </p:txBody>
-      </p:sp>
-      <p:sp>
-        <p:nvSpPr>
-          <p:cNvPr id="139" name="Plus 167"/>
-          <p:cNvSpPr>
-            <a:spLocks noChangeAspect="1"/>
-          </p:cNvSpPr>
-          <p:nvPr/>
-        </p:nvSpPr>
-        <p:spPr>
-          <a:xfrm>
-            <a:off x="3331573" y="4471309"/>
-            <a:ext cx="581820" cy="581820"/>
-          </a:xfrm>
-          <a:prstGeom prst="mathPlus">
-            <a:avLst/>
-          </a:prstGeom>
-          <a:solidFill>
-            <a:srgbClr val="00B050"/>
-          </a:solidFill>
-          <a:ln w="38100">
-            <a:solidFill>
-              <a:schemeClr val="bg1"/>
-            </a:solidFill>
-          </a:ln>
-        </p:spPr>
-        <p:style>
-          <a:lnRef idx="2">
-            <a:schemeClr val="accent1">
-              <a:shade val="50000"/>
-            </a:schemeClr>
-          </a:lnRef>
-          <a:fillRef idx="1">
-            <a:schemeClr val="accent1"/>
-          </a:fillRef>
-          <a:effectRef idx="0">
-            <a:schemeClr val="accent1"/>
-          </a:effectRef>
-          <a:fontRef idx="minor">
-            <a:schemeClr val="lt1"/>
-          </a:fontRef>
-        </p:style>
-        <p:txBody>
-          <a:bodyPr rtlCol="0" anchor="ctr"/>
-          <a:lstStyle/>
-          <a:p>
-            <a:pPr algn="ctr"/>
-            <a:endParaRPr lang="en-US"/>
-          </a:p>
-        </p:txBody>
-      </p:sp>
       <p:grpSp>
         <p:nvGrpSpPr>
           <p:cNvPr id="140" name="Group 139"/>
@@ -7983,7 +8025,7 @@
         </p:nvSpPr>
         <p:spPr>
           <a:xfrm>
-            <a:off x="5123864" y="5120725"/>
+            <a:off x="5158049" y="5549103"/>
             <a:ext cx="689438" cy="338554"/>
           </a:xfrm>
           <a:prstGeom prst="rect">

</xml_diff>